<commit_message>
updated Mock about me
</commit_message>
<xml_diff>
--- a/Mocks/CS mock about_me.pptx
+++ b/Mocks/CS mock about_me.pptx
@@ -3370,14 +3370,6 @@
 <file path=ppt/slides/slide1.xml><?xml version="1.0" encoding="utf-8"?>
 <p:sld xmlns:a="http://schemas.openxmlformats.org/drawingml/2006/main" xmlns:r="http://schemas.openxmlformats.org/officeDocument/2006/relationships" xmlns:p="http://schemas.openxmlformats.org/presentationml/2006/main">
   <p:cSld>
-    <p:bg>
-      <p:bgPr>
-        <a:solidFill>
-          <a:srgbClr val="ECE6EB"/>
-        </a:solidFill>
-        <a:effectLst/>
-      </p:bgPr>
-    </p:bg>
     <p:spTree>
       <p:nvGrpSpPr>
         <p:cNvPr id="1" name=""/>
@@ -3394,10 +3386,10 @@
       </p:grpSpPr>
       <p:sp>
         <p:nvSpPr>
-          <p:cNvPr id="126" name="Rectangle: Rounded Corners 125">
+          <p:cNvPr id="70" name="Rectangle: Rounded Corners 69">
             <a:extLst>
               <a:ext uri="{FF2B5EF4-FFF2-40B4-BE49-F238E27FC236}">
-                <a16:creationId xmlns:a16="http://schemas.microsoft.com/office/drawing/2014/main" id="{00202B43-09CC-46FD-AEF9-03AA9E80F325}"/>
+                <a16:creationId xmlns:a16="http://schemas.microsoft.com/office/drawing/2014/main" id="{D596F6C3-3409-4C80-A6E3-FB87C0D88517}"/>
               </a:ext>
             </a:extLst>
           </p:cNvPr>
@@ -3406,14 +3398,238 @@
         </p:nvSpPr>
         <p:spPr>
           <a:xfrm>
-            <a:off x="1943140" y="4740516"/>
-            <a:ext cx="2443530" cy="1907419"/>
+            <a:off x="9670532" y="2326858"/>
+            <a:ext cx="2449494" cy="4278903"/>
           </a:xfrm>
           <a:prstGeom prst="roundRect">
             <a:avLst/>
           </a:prstGeom>
           <a:solidFill>
-            <a:srgbClr val="FEF1E8"/>
+            <a:srgbClr val="EAEAEA"/>
+          </a:solidFill>
+          <a:ln w="19050" cap="flat" cmpd="sng" algn="ctr">
+            <a:solidFill>
+              <a:schemeClr val="dk1"/>
+            </a:solidFill>
+            <a:prstDash val="solid"/>
+            <a:round/>
+            <a:headEnd type="none" w="med" len="med"/>
+            <a:tailEnd type="none" w="med" len="med"/>
+          </a:ln>
+        </p:spPr>
+        <p:style>
+          <a:lnRef idx="0">
+            <a:scrgbClr r="0" g="0" b="0"/>
+          </a:lnRef>
+          <a:fillRef idx="0">
+            <a:scrgbClr r="0" g="0" b="0"/>
+          </a:fillRef>
+          <a:effectRef idx="0">
+            <a:scrgbClr r="0" g="0" b="0"/>
+          </a:effectRef>
+          <a:fontRef idx="minor">
+            <a:schemeClr val="dk1"/>
+          </a:fontRef>
+        </p:style>
+        <p:txBody>
+          <a:bodyPr rtlCol="0" anchor="ctr"/>
+          <a:lstStyle/>
+          <a:p>
+            <a:pPr algn="ctr"/>
+            <a:endParaRPr lang="en-US"/>
+          </a:p>
+        </p:txBody>
+      </p:sp>
+      <p:sp>
+        <p:nvSpPr>
+          <p:cNvPr id="69" name="Rectangle: Rounded Corners 68">
+            <a:extLst>
+              <a:ext uri="{FF2B5EF4-FFF2-40B4-BE49-F238E27FC236}">
+                <a16:creationId xmlns:a16="http://schemas.microsoft.com/office/drawing/2014/main" id="{25B49AA3-FFC0-459A-A442-E31C4D9F09F9}"/>
+              </a:ext>
+            </a:extLst>
+          </p:cNvPr>
+          <p:cNvSpPr/>
+          <p:nvPr/>
+        </p:nvSpPr>
+        <p:spPr>
+          <a:xfrm>
+            <a:off x="7101918" y="2331391"/>
+            <a:ext cx="2449494" cy="4293775"/>
+          </a:xfrm>
+          <a:prstGeom prst="roundRect">
+            <a:avLst/>
+          </a:prstGeom>
+          <a:solidFill>
+            <a:srgbClr val="EAEAEA"/>
+          </a:solidFill>
+          <a:ln w="19050" cap="flat" cmpd="sng" algn="ctr">
+            <a:solidFill>
+              <a:schemeClr val="dk1"/>
+            </a:solidFill>
+            <a:prstDash val="solid"/>
+            <a:round/>
+            <a:headEnd type="none" w="med" len="med"/>
+            <a:tailEnd type="none" w="med" len="med"/>
+          </a:ln>
+        </p:spPr>
+        <p:style>
+          <a:lnRef idx="0">
+            <a:scrgbClr r="0" g="0" b="0"/>
+          </a:lnRef>
+          <a:fillRef idx="0">
+            <a:scrgbClr r="0" g="0" b="0"/>
+          </a:fillRef>
+          <a:effectRef idx="0">
+            <a:scrgbClr r="0" g="0" b="0"/>
+          </a:effectRef>
+          <a:fontRef idx="minor">
+            <a:schemeClr val="dk1"/>
+          </a:fontRef>
+        </p:style>
+        <p:txBody>
+          <a:bodyPr rtlCol="0" anchor="ctr"/>
+          <a:lstStyle/>
+          <a:p>
+            <a:pPr algn="ctr"/>
+            <a:endParaRPr lang="en-US" dirty="0"/>
+          </a:p>
+        </p:txBody>
+      </p:sp>
+      <p:sp>
+        <p:nvSpPr>
+          <p:cNvPr id="67" name="Rectangle: Rounded Corners 66">
+            <a:extLst>
+              <a:ext uri="{FF2B5EF4-FFF2-40B4-BE49-F238E27FC236}">
+                <a16:creationId xmlns:a16="http://schemas.microsoft.com/office/drawing/2014/main" id="{C260CC9C-F48B-4B39-8D1B-FACA82030E94}"/>
+              </a:ext>
+            </a:extLst>
+          </p:cNvPr>
+          <p:cNvSpPr/>
+          <p:nvPr/>
+        </p:nvSpPr>
+        <p:spPr>
+          <a:xfrm>
+            <a:off x="1937176" y="2326859"/>
+            <a:ext cx="2449494" cy="4321076"/>
+          </a:xfrm>
+          <a:prstGeom prst="roundRect">
+            <a:avLst/>
+          </a:prstGeom>
+          <a:solidFill>
+            <a:srgbClr val="EAEAEA"/>
+          </a:solidFill>
+          <a:ln w="19050" cap="flat" cmpd="sng" algn="ctr">
+            <a:solidFill>
+              <a:schemeClr val="dk1"/>
+            </a:solidFill>
+            <a:prstDash val="solid"/>
+            <a:round/>
+            <a:headEnd type="none" w="med" len="med"/>
+            <a:tailEnd type="none" w="med" len="med"/>
+          </a:ln>
+        </p:spPr>
+        <p:style>
+          <a:lnRef idx="0">
+            <a:scrgbClr r="0" g="0" b="0"/>
+          </a:lnRef>
+          <a:fillRef idx="0">
+            <a:scrgbClr r="0" g="0" b="0"/>
+          </a:fillRef>
+          <a:effectRef idx="0">
+            <a:scrgbClr r="0" g="0" b="0"/>
+          </a:effectRef>
+          <a:fontRef idx="minor">
+            <a:schemeClr val="dk1"/>
+          </a:fontRef>
+        </p:style>
+        <p:txBody>
+          <a:bodyPr rtlCol="0" anchor="ctr"/>
+          <a:lstStyle/>
+          <a:p>
+            <a:pPr algn="ctr"/>
+            <a:endParaRPr lang="en-US"/>
+          </a:p>
+        </p:txBody>
+      </p:sp>
+      <p:sp>
+        <p:nvSpPr>
+          <p:cNvPr id="68" name="Rectangle: Rounded Corners 67">
+            <a:extLst>
+              <a:ext uri="{FF2B5EF4-FFF2-40B4-BE49-F238E27FC236}">
+                <a16:creationId xmlns:a16="http://schemas.microsoft.com/office/drawing/2014/main" id="{6E011812-FB52-4B01-98B6-D06B3BC29071}"/>
+              </a:ext>
+            </a:extLst>
+          </p:cNvPr>
+          <p:cNvSpPr/>
+          <p:nvPr/>
+        </p:nvSpPr>
+        <p:spPr>
+          <a:xfrm>
+            <a:off x="4533304" y="2326859"/>
+            <a:ext cx="2449494" cy="4337719"/>
+          </a:xfrm>
+          <a:prstGeom prst="roundRect">
+            <a:avLst/>
+          </a:prstGeom>
+          <a:solidFill>
+            <a:srgbClr val="EAEAEA"/>
+          </a:solidFill>
+          <a:ln w="19050" cap="flat" cmpd="sng" algn="ctr">
+            <a:solidFill>
+              <a:schemeClr val="dk1"/>
+            </a:solidFill>
+            <a:prstDash val="solid"/>
+            <a:round/>
+            <a:headEnd type="none" w="med" len="med"/>
+            <a:tailEnd type="none" w="med" len="med"/>
+          </a:ln>
+        </p:spPr>
+        <p:style>
+          <a:lnRef idx="0">
+            <a:scrgbClr r="0" g="0" b="0"/>
+          </a:lnRef>
+          <a:fillRef idx="0">
+            <a:scrgbClr r="0" g="0" b="0"/>
+          </a:fillRef>
+          <a:effectRef idx="0">
+            <a:scrgbClr r="0" g="0" b="0"/>
+          </a:effectRef>
+          <a:fontRef idx="minor">
+            <a:schemeClr val="dk1"/>
+          </a:fontRef>
+        </p:style>
+        <p:txBody>
+          <a:bodyPr rtlCol="0" anchor="ctr"/>
+          <a:lstStyle/>
+          <a:p>
+            <a:pPr algn="ctr"/>
+            <a:endParaRPr lang="en-US"/>
+          </a:p>
+        </p:txBody>
+      </p:sp>
+      <p:sp>
+        <p:nvSpPr>
+          <p:cNvPr id="120" name="Rectangle: Rounded Corners 119">
+            <a:extLst>
+              <a:ext uri="{FF2B5EF4-FFF2-40B4-BE49-F238E27FC236}">
+                <a16:creationId xmlns:a16="http://schemas.microsoft.com/office/drawing/2014/main" id="{580E62E1-C78E-414D-9641-50159512146F}"/>
+              </a:ext>
+            </a:extLst>
+          </p:cNvPr>
+          <p:cNvSpPr/>
+          <p:nvPr/>
+        </p:nvSpPr>
+        <p:spPr>
+          <a:xfrm>
+            <a:off x="4539268" y="4710668"/>
+            <a:ext cx="2443530" cy="1907419"/>
+          </a:xfrm>
+          <a:prstGeom prst="roundRect">
+            <a:avLst/>
+          </a:prstGeom>
+          <a:solidFill>
+            <a:srgbClr val="ECDDF5"/>
           </a:solidFill>
           <a:ln>
             <a:noFill/>
@@ -3446,10 +3662,10 @@
       </p:sp>
       <p:sp>
         <p:nvSpPr>
-          <p:cNvPr id="121" name="Rectangle 120">
+          <p:cNvPr id="137" name="Rectangle: Rounded Corners 136">
             <a:extLst>
               <a:ext uri="{FF2B5EF4-FFF2-40B4-BE49-F238E27FC236}">
-                <a16:creationId xmlns:a16="http://schemas.microsoft.com/office/drawing/2014/main" id="{60F2ADF4-A9C0-498B-9C76-52328564498C}"/>
+                <a16:creationId xmlns:a16="http://schemas.microsoft.com/office/drawing/2014/main" id="{63451394-FE34-421B-B0A6-8EBD82CCF985}"/>
               </a:ext>
             </a:extLst>
           </p:cNvPr>
@@ -3458,60 +3674,14 @@
         </p:nvSpPr>
         <p:spPr>
           <a:xfrm>
-            <a:off x="4545233" y="4720114"/>
-            <a:ext cx="2426679" cy="461665"/>
-          </a:xfrm>
-          <a:prstGeom prst="rect">
-            <a:avLst/>
-          </a:prstGeom>
-        </p:spPr>
-        <p:style>
-          <a:lnRef idx="2">
-            <a:schemeClr val="accent1">
-              <a:shade val="50000"/>
-            </a:schemeClr>
-          </a:lnRef>
-          <a:fillRef idx="1">
-            <a:schemeClr val="accent1"/>
-          </a:fillRef>
-          <a:effectRef idx="0">
-            <a:schemeClr val="accent1"/>
-          </a:effectRef>
-          <a:fontRef idx="minor">
-            <a:schemeClr val="lt1"/>
-          </a:fontRef>
-        </p:style>
-        <p:txBody>
-          <a:bodyPr rtlCol="0" anchor="ctr"/>
-          <a:lstStyle/>
-          <a:p>
-            <a:pPr algn="ctr"/>
-            <a:endParaRPr lang="en-US"/>
-          </a:p>
-        </p:txBody>
-      </p:sp>
-      <p:sp>
-        <p:nvSpPr>
-          <p:cNvPr id="120" name="Rectangle: Rounded Corners 119">
-            <a:extLst>
-              <a:ext uri="{FF2B5EF4-FFF2-40B4-BE49-F238E27FC236}">
-                <a16:creationId xmlns:a16="http://schemas.microsoft.com/office/drawing/2014/main" id="{580E62E1-C78E-414D-9641-50159512146F}"/>
-              </a:ext>
-            </a:extLst>
-          </p:cNvPr>
-          <p:cNvSpPr/>
-          <p:nvPr/>
-        </p:nvSpPr>
-        <p:spPr>
-          <a:xfrm>
-            <a:off x="4528382" y="4720114"/>
-            <a:ext cx="2443530" cy="1907419"/>
+            <a:off x="7109385" y="4934786"/>
+            <a:ext cx="2446265" cy="1688773"/>
           </a:xfrm>
           <a:prstGeom prst="roundRect">
             <a:avLst/>
           </a:prstGeom>
           <a:solidFill>
-            <a:srgbClr val="FEF1E8"/>
+            <a:srgbClr val="ECDDF5"/>
           </a:solidFill>
           <a:ln>
             <a:noFill/>
@@ -3538,7 +3708,215 @@
           <a:lstStyle/>
           <a:p>
             <a:pPr algn="ctr"/>
+            <a:endParaRPr lang="en-US" dirty="0"/>
+          </a:p>
+        </p:txBody>
+      </p:sp>
+      <p:sp>
+        <p:nvSpPr>
+          <p:cNvPr id="134" name="Rectangle 133">
+            <a:extLst>
+              <a:ext uri="{FF2B5EF4-FFF2-40B4-BE49-F238E27FC236}">
+                <a16:creationId xmlns:a16="http://schemas.microsoft.com/office/drawing/2014/main" id="{7C77654D-C93C-4EDF-9E1A-6B5CAA607207}"/>
+              </a:ext>
+            </a:extLst>
+          </p:cNvPr>
+          <p:cNvSpPr/>
+          <p:nvPr/>
+        </p:nvSpPr>
+        <p:spPr>
+          <a:xfrm>
+            <a:off x="9690317" y="4720114"/>
+            <a:ext cx="2449494" cy="461665"/>
+          </a:xfrm>
+          <a:prstGeom prst="rect">
+            <a:avLst/>
+          </a:prstGeom>
+          <a:solidFill>
+            <a:srgbClr val="ECDDF5"/>
+          </a:solidFill>
+          <a:ln>
+            <a:noFill/>
+          </a:ln>
+        </p:spPr>
+        <p:style>
+          <a:lnRef idx="2">
+            <a:schemeClr val="accent1">
+              <a:shade val="50000"/>
+            </a:schemeClr>
+          </a:lnRef>
+          <a:fillRef idx="1">
+            <a:schemeClr val="accent1"/>
+          </a:fillRef>
+          <a:effectRef idx="0">
+            <a:schemeClr val="accent1"/>
+          </a:effectRef>
+          <a:fontRef idx="minor">
+            <a:schemeClr val="lt1"/>
+          </a:fontRef>
+        </p:style>
+        <p:txBody>
+          <a:bodyPr rtlCol="0" anchor="ctr"/>
+          <a:lstStyle/>
+          <a:p>
+            <a:pPr algn="ctr"/>
             <a:endParaRPr lang="en-US"/>
+          </a:p>
+        </p:txBody>
+      </p:sp>
+      <p:sp>
+        <p:nvSpPr>
+          <p:cNvPr id="133" name="Rectangle: Rounded Corners 132">
+            <a:extLst>
+              <a:ext uri="{FF2B5EF4-FFF2-40B4-BE49-F238E27FC236}">
+                <a16:creationId xmlns:a16="http://schemas.microsoft.com/office/drawing/2014/main" id="{97BA791C-B07F-4B20-9AD4-D26D5B71FA79}"/>
+              </a:ext>
+            </a:extLst>
+          </p:cNvPr>
+          <p:cNvSpPr/>
+          <p:nvPr/>
+        </p:nvSpPr>
+        <p:spPr>
+          <a:xfrm>
+            <a:off x="9690317" y="4916988"/>
+            <a:ext cx="2446265" cy="1688773"/>
+          </a:xfrm>
+          <a:prstGeom prst="roundRect">
+            <a:avLst/>
+          </a:prstGeom>
+          <a:solidFill>
+            <a:srgbClr val="ECDDF5"/>
+          </a:solidFill>
+          <a:ln>
+            <a:noFill/>
+          </a:ln>
+        </p:spPr>
+        <p:style>
+          <a:lnRef idx="2">
+            <a:schemeClr val="accent1">
+              <a:shade val="50000"/>
+            </a:schemeClr>
+          </a:lnRef>
+          <a:fillRef idx="1">
+            <a:schemeClr val="accent1"/>
+          </a:fillRef>
+          <a:effectRef idx="0">
+            <a:schemeClr val="accent1"/>
+          </a:effectRef>
+          <a:fontRef idx="minor">
+            <a:schemeClr val="lt1"/>
+          </a:fontRef>
+        </p:style>
+        <p:txBody>
+          <a:bodyPr rtlCol="0" anchor="ctr"/>
+          <a:lstStyle/>
+          <a:p>
+            <a:pPr algn="ctr"/>
+            <a:endParaRPr lang="en-US"/>
+          </a:p>
+        </p:txBody>
+      </p:sp>
+      <p:sp>
+        <p:nvSpPr>
+          <p:cNvPr id="132" name="Rectangle 131">
+            <a:extLst>
+              <a:ext uri="{FF2B5EF4-FFF2-40B4-BE49-F238E27FC236}">
+                <a16:creationId xmlns:a16="http://schemas.microsoft.com/office/drawing/2014/main" id="{F8D7EE67-3391-4134-8141-F03295C167D6}"/>
+              </a:ext>
+            </a:extLst>
+          </p:cNvPr>
+          <p:cNvSpPr/>
+          <p:nvPr/>
+        </p:nvSpPr>
+        <p:spPr>
+          <a:xfrm>
+            <a:off x="7113624" y="4717747"/>
+            <a:ext cx="2437788" cy="592609"/>
+          </a:xfrm>
+          <a:prstGeom prst="rect">
+            <a:avLst/>
+          </a:prstGeom>
+          <a:solidFill>
+            <a:srgbClr val="ECDDF5"/>
+          </a:solidFill>
+          <a:ln>
+            <a:noFill/>
+          </a:ln>
+        </p:spPr>
+        <p:style>
+          <a:lnRef idx="2">
+            <a:schemeClr val="accent1">
+              <a:shade val="50000"/>
+            </a:schemeClr>
+          </a:lnRef>
+          <a:fillRef idx="1">
+            <a:schemeClr val="accent1"/>
+          </a:fillRef>
+          <a:effectRef idx="0">
+            <a:schemeClr val="accent1"/>
+          </a:effectRef>
+          <a:fontRef idx="minor">
+            <a:schemeClr val="lt1"/>
+          </a:fontRef>
+        </p:style>
+        <p:txBody>
+          <a:bodyPr rtlCol="0" anchor="ctr"/>
+          <a:lstStyle/>
+          <a:p>
+            <a:pPr algn="ctr"/>
+            <a:endParaRPr lang="en-US"/>
+          </a:p>
+        </p:txBody>
+      </p:sp>
+      <p:sp>
+        <p:nvSpPr>
+          <p:cNvPr id="126" name="Rectangle: Rounded Corners 125">
+            <a:extLst>
+              <a:ext uri="{FF2B5EF4-FFF2-40B4-BE49-F238E27FC236}">
+                <a16:creationId xmlns:a16="http://schemas.microsoft.com/office/drawing/2014/main" id="{00202B43-09CC-46FD-AEF9-03AA9E80F325}"/>
+              </a:ext>
+            </a:extLst>
+          </p:cNvPr>
+          <p:cNvSpPr/>
+          <p:nvPr/>
+        </p:nvSpPr>
+        <p:spPr>
+          <a:xfrm>
+            <a:off x="1943140" y="4725593"/>
+            <a:ext cx="2443530" cy="1907419"/>
+          </a:xfrm>
+          <a:prstGeom prst="roundRect">
+            <a:avLst/>
+          </a:prstGeom>
+          <a:solidFill>
+            <a:srgbClr val="ECDDF5"/>
+          </a:solidFill>
+          <a:ln>
+            <a:noFill/>
+          </a:ln>
+        </p:spPr>
+        <p:style>
+          <a:lnRef idx="2">
+            <a:schemeClr val="accent1">
+              <a:shade val="50000"/>
+            </a:schemeClr>
+          </a:lnRef>
+          <a:fillRef idx="1">
+            <a:schemeClr val="accent1"/>
+          </a:fillRef>
+          <a:effectRef idx="0">
+            <a:schemeClr val="accent1"/>
+          </a:effectRef>
+          <a:fontRef idx="minor">
+            <a:schemeClr val="lt1"/>
+          </a:fontRef>
+        </p:style>
+        <p:txBody>
+          <a:bodyPr rtlCol="0" anchor="ctr"/>
+          <a:lstStyle/>
+          <a:p>
+            <a:pPr algn="ctr"/>
+            <a:endParaRPr lang="en-US" dirty="0"/>
           </a:p>
         </p:txBody>
       </p:sp>
@@ -3556,7 +3934,7 @@
         </p:nvSpPr>
         <p:spPr>
           <a:xfrm>
-            <a:off x="-108857" y="0"/>
+            <a:off x="22969" y="-11589"/>
             <a:ext cx="12300857" cy="1247911"/>
           </a:xfrm>
           <a:prstGeom prst="rect">
@@ -4122,7 +4500,7 @@
               <a:r>
                 <a:rPr lang="en-US" sz="3200" b="1" dirty="0">
                   <a:solidFill>
-                    <a:srgbClr val="ECE6EB"/>
+                    <a:srgbClr val="ECDDF5"/>
                   </a:solidFill>
                   <a:latin typeface="Brush Script MT" panose="03060802040406070304" pitchFamily="66" charset="0"/>
                   <a:ea typeface="Apple Chancery" charset="0"/>
@@ -4164,7 +4542,7 @@
               <a:r>
                 <a:rPr lang="en-US" sz="2400" b="1" dirty="0">
                   <a:solidFill>
-                    <a:srgbClr val="ECE6EB"/>
+                    <a:srgbClr val="ECDDF5"/>
                   </a:solidFill>
                   <a:latin typeface="Brush Script MT" panose="03060802040406070304" pitchFamily="66" charset="0"/>
                   <a:ea typeface="Apple Chancery" charset="0"/>
@@ -4190,11 +4568,14 @@
         </p:nvGrpSpPr>
         <p:grpSpPr>
           <a:xfrm>
-            <a:off x="9959240" y="246465"/>
+            <a:off x="11441051" y="288109"/>
             <a:ext cx="588161" cy="707886"/>
             <a:chOff x="4008789" y="4749342"/>
             <a:chExt cx="886763" cy="1126299"/>
           </a:xfrm>
+          <a:solidFill>
+            <a:srgbClr val="DDDDDD"/>
+          </a:solidFill>
         </p:grpSpPr>
         <p:sp>
           <p:nvSpPr>
@@ -4216,7 +4597,9 @@
             <a:prstGeom prst="ellipse">
               <a:avLst/>
             </a:prstGeom>
-            <a:noFill/>
+            <a:solidFill>
+              <a:srgbClr val="64327A"/>
+            </a:solidFill>
             <a:ln w="38100" cap="flat" cmpd="sng" algn="ctr">
               <a:solidFill>
                 <a:schemeClr val="dk1"/>
@@ -4310,6 +4693,9 @@
             <a:chOff x="5313421" y="4351352"/>
             <a:chExt cx="815350" cy="738956"/>
           </a:xfrm>
+          <a:solidFill>
+            <a:srgbClr val="DDDDDD"/>
+          </a:solidFill>
         </p:grpSpPr>
         <p:sp>
           <p:nvSpPr>
@@ -4331,7 +4717,8 @@
             <a:prstGeom prst="rect">
               <a:avLst/>
             </a:prstGeom>
-            <a:ln>
+            <a:grpFill/>
+            <a:ln w="38100">
               <a:headEnd type="none" w="med" len="med"/>
               <a:tailEnd type="none" w="med" len="med"/>
             </a:ln>
@@ -4381,6 +4768,8 @@
             <a:prstGeom prst="triangle">
               <a:avLst/>
             </a:prstGeom>
+            <a:grpFill/>
+            <a:ln w="38100"/>
           </p:spPr>
           <p:style>
             <a:lnRef idx="2">
@@ -4427,6 +4816,8 @@
             <a:prstGeom prst="rect">
               <a:avLst/>
             </a:prstGeom>
+            <a:grpFill/>
+            <a:ln w="38100"/>
           </p:spPr>
           <p:style>
             <a:lnRef idx="2">
@@ -4468,11 +4859,14 @@
         </p:nvGrpSpPr>
         <p:grpSpPr>
           <a:xfrm>
-            <a:off x="11293144" y="396562"/>
+            <a:off x="10741464" y="473803"/>
             <a:ext cx="466052" cy="441331"/>
             <a:chOff x="6449764" y="4349501"/>
             <a:chExt cx="737165" cy="487155"/>
           </a:xfrm>
+          <a:solidFill>
+            <a:srgbClr val="DDDDDD"/>
+          </a:solidFill>
         </p:grpSpPr>
         <p:sp>
           <p:nvSpPr>
@@ -4494,7 +4888,7 @@
             <a:prstGeom prst="rect">
               <a:avLst/>
             </a:prstGeom>
-            <a:noFill/>
+            <a:grpFill/>
             <a:ln w="38100" cap="flat" cmpd="sng" algn="ctr">
               <a:solidFill>
                 <a:schemeClr val="dk1"/>
@@ -4547,6 +4941,7 @@
               <a:chOff x="6449764" y="4349501"/>
               <a:chExt cx="737165" cy="487155"/>
             </a:xfrm>
+            <a:grpFill/>
           </p:grpSpPr>
           <p:sp>
             <p:nvSpPr>
@@ -4568,7 +4963,7 @@
               <a:prstGeom prst="rect">
                 <a:avLst/>
               </a:prstGeom>
-              <a:noFill/>
+              <a:grpFill/>
               <a:ln w="38100" cap="flat" cmpd="sng" algn="ctr">
                 <a:solidFill>
                   <a:schemeClr val="dk1"/>
@@ -4622,7 +5017,7 @@
               <a:prstGeom prst="rect">
                 <a:avLst/>
               </a:prstGeom>
-              <a:noFill/>
+              <a:grpFill/>
               <a:ln w="38100" cap="flat" cmpd="sng" algn="ctr">
                 <a:solidFill>
                   <a:schemeClr val="dk1"/>
@@ -4658,222 +5053,6 @@
           </p:sp>
         </p:grpSp>
       </p:grpSp>
-      <p:sp>
-        <p:nvSpPr>
-          <p:cNvPr id="67" name="Rectangle: Rounded Corners 66">
-            <a:extLst>
-              <a:ext uri="{FF2B5EF4-FFF2-40B4-BE49-F238E27FC236}">
-                <a16:creationId xmlns:a16="http://schemas.microsoft.com/office/drawing/2014/main" id="{C260CC9C-F48B-4B39-8D1B-FACA82030E94}"/>
-              </a:ext>
-            </a:extLst>
-          </p:cNvPr>
-          <p:cNvSpPr/>
-          <p:nvPr/>
-        </p:nvSpPr>
-        <p:spPr>
-          <a:xfrm>
-            <a:off x="1937176" y="2326859"/>
-            <a:ext cx="2449494" cy="4321076"/>
-          </a:xfrm>
-          <a:prstGeom prst="roundRect">
-            <a:avLst/>
-          </a:prstGeom>
-          <a:noFill/>
-          <a:ln w="19050" cap="flat" cmpd="sng" algn="ctr">
-            <a:solidFill>
-              <a:schemeClr val="dk1"/>
-            </a:solidFill>
-            <a:prstDash val="solid"/>
-            <a:round/>
-            <a:headEnd type="none" w="med" len="med"/>
-            <a:tailEnd type="none" w="med" len="med"/>
-          </a:ln>
-        </p:spPr>
-        <p:style>
-          <a:lnRef idx="0">
-            <a:scrgbClr r="0" g="0" b="0"/>
-          </a:lnRef>
-          <a:fillRef idx="0">
-            <a:scrgbClr r="0" g="0" b="0"/>
-          </a:fillRef>
-          <a:effectRef idx="0">
-            <a:scrgbClr r="0" g="0" b="0"/>
-          </a:effectRef>
-          <a:fontRef idx="minor">
-            <a:schemeClr val="dk1"/>
-          </a:fontRef>
-        </p:style>
-        <p:txBody>
-          <a:bodyPr rtlCol="0" anchor="ctr"/>
-          <a:lstStyle/>
-          <a:p>
-            <a:pPr algn="ctr"/>
-            <a:endParaRPr lang="en-US"/>
-          </a:p>
-        </p:txBody>
-      </p:sp>
-      <p:sp>
-        <p:nvSpPr>
-          <p:cNvPr id="68" name="Rectangle: Rounded Corners 67">
-            <a:extLst>
-              <a:ext uri="{FF2B5EF4-FFF2-40B4-BE49-F238E27FC236}">
-                <a16:creationId xmlns:a16="http://schemas.microsoft.com/office/drawing/2014/main" id="{6E011812-FB52-4B01-98B6-D06B3BC29071}"/>
-              </a:ext>
-            </a:extLst>
-          </p:cNvPr>
-          <p:cNvSpPr/>
-          <p:nvPr/>
-        </p:nvSpPr>
-        <p:spPr>
-          <a:xfrm>
-            <a:off x="4533304" y="2326859"/>
-            <a:ext cx="2449494" cy="4298307"/>
-          </a:xfrm>
-          <a:prstGeom prst="roundRect">
-            <a:avLst/>
-          </a:prstGeom>
-          <a:noFill/>
-          <a:ln w="19050" cap="flat" cmpd="sng" algn="ctr">
-            <a:solidFill>
-              <a:schemeClr val="dk1"/>
-            </a:solidFill>
-            <a:prstDash val="solid"/>
-            <a:round/>
-            <a:headEnd type="none" w="med" len="med"/>
-            <a:tailEnd type="none" w="med" len="med"/>
-          </a:ln>
-        </p:spPr>
-        <p:style>
-          <a:lnRef idx="0">
-            <a:scrgbClr r="0" g="0" b="0"/>
-          </a:lnRef>
-          <a:fillRef idx="0">
-            <a:scrgbClr r="0" g="0" b="0"/>
-          </a:fillRef>
-          <a:effectRef idx="0">
-            <a:scrgbClr r="0" g="0" b="0"/>
-          </a:effectRef>
-          <a:fontRef idx="minor">
-            <a:schemeClr val="dk1"/>
-          </a:fontRef>
-        </p:style>
-        <p:txBody>
-          <a:bodyPr rtlCol="0" anchor="ctr"/>
-          <a:lstStyle/>
-          <a:p>
-            <a:pPr algn="ctr"/>
-            <a:endParaRPr lang="en-US"/>
-          </a:p>
-        </p:txBody>
-      </p:sp>
-      <p:sp>
-        <p:nvSpPr>
-          <p:cNvPr id="69" name="Rectangle: Rounded Corners 68">
-            <a:extLst>
-              <a:ext uri="{FF2B5EF4-FFF2-40B4-BE49-F238E27FC236}">
-                <a16:creationId xmlns:a16="http://schemas.microsoft.com/office/drawing/2014/main" id="{25B49AA3-FFC0-459A-A442-E31C4D9F09F9}"/>
-              </a:ext>
-            </a:extLst>
-          </p:cNvPr>
-          <p:cNvSpPr/>
-          <p:nvPr/>
-        </p:nvSpPr>
-        <p:spPr>
-          <a:xfrm>
-            <a:off x="7101918" y="2331391"/>
-            <a:ext cx="2449494" cy="4293775"/>
-          </a:xfrm>
-          <a:prstGeom prst="roundRect">
-            <a:avLst/>
-          </a:prstGeom>
-          <a:noFill/>
-          <a:ln w="19050" cap="flat" cmpd="sng" algn="ctr">
-            <a:solidFill>
-              <a:schemeClr val="dk1"/>
-            </a:solidFill>
-            <a:prstDash val="solid"/>
-            <a:round/>
-            <a:headEnd type="none" w="med" len="med"/>
-            <a:tailEnd type="none" w="med" len="med"/>
-          </a:ln>
-        </p:spPr>
-        <p:style>
-          <a:lnRef idx="0">
-            <a:scrgbClr r="0" g="0" b="0"/>
-          </a:lnRef>
-          <a:fillRef idx="0">
-            <a:scrgbClr r="0" g="0" b="0"/>
-          </a:fillRef>
-          <a:effectRef idx="0">
-            <a:scrgbClr r="0" g="0" b="0"/>
-          </a:effectRef>
-          <a:fontRef idx="minor">
-            <a:schemeClr val="dk1"/>
-          </a:fontRef>
-        </p:style>
-        <p:txBody>
-          <a:bodyPr rtlCol="0" anchor="ctr"/>
-          <a:lstStyle/>
-          <a:p>
-            <a:pPr algn="ctr"/>
-            <a:endParaRPr lang="en-US"/>
-          </a:p>
-        </p:txBody>
-      </p:sp>
-      <p:sp>
-        <p:nvSpPr>
-          <p:cNvPr id="70" name="Rectangle: Rounded Corners 69">
-            <a:extLst>
-              <a:ext uri="{FF2B5EF4-FFF2-40B4-BE49-F238E27FC236}">
-                <a16:creationId xmlns:a16="http://schemas.microsoft.com/office/drawing/2014/main" id="{D596F6C3-3409-4C80-A6E3-FB87C0D88517}"/>
-              </a:ext>
-            </a:extLst>
-          </p:cNvPr>
-          <p:cNvSpPr/>
-          <p:nvPr/>
-        </p:nvSpPr>
-        <p:spPr>
-          <a:xfrm>
-            <a:off x="9670532" y="2326858"/>
-            <a:ext cx="2449494" cy="4278903"/>
-          </a:xfrm>
-          <a:prstGeom prst="roundRect">
-            <a:avLst/>
-          </a:prstGeom>
-          <a:noFill/>
-          <a:ln w="19050" cap="flat" cmpd="sng" algn="ctr">
-            <a:solidFill>
-              <a:schemeClr val="dk1"/>
-            </a:solidFill>
-            <a:prstDash val="solid"/>
-            <a:round/>
-            <a:headEnd type="none" w="med" len="med"/>
-            <a:tailEnd type="none" w="med" len="med"/>
-          </a:ln>
-        </p:spPr>
-        <p:style>
-          <a:lnRef idx="0">
-            <a:scrgbClr r="0" g="0" b="0"/>
-          </a:lnRef>
-          <a:fillRef idx="0">
-            <a:scrgbClr r="0" g="0" b="0"/>
-          </a:fillRef>
-          <a:effectRef idx="0">
-            <a:scrgbClr r="0" g="0" b="0"/>
-          </a:effectRef>
-          <a:fontRef idx="minor">
-            <a:schemeClr val="dk1"/>
-          </a:fontRef>
-        </p:style>
-        <p:txBody>
-          <a:bodyPr rtlCol="0" anchor="ctr"/>
-          <a:lstStyle/>
-          <a:p>
-            <a:pPr algn="ctr"/>
-            <a:endParaRPr lang="en-US"/>
-          </a:p>
-        </p:txBody>
-      </p:sp>
       <p:grpSp>
         <p:nvGrpSpPr>
           <p:cNvPr id="124" name="Group 123">
@@ -4888,11 +5067,14 @@
         </p:nvGrpSpPr>
         <p:grpSpPr>
           <a:xfrm>
-            <a:off x="4545233" y="4698342"/>
-            <a:ext cx="2437565" cy="1692771"/>
-            <a:chOff x="4545233" y="4698342"/>
-            <a:chExt cx="2437565" cy="1692771"/>
-          </a:xfrm>
+            <a:off x="4539268" y="4686155"/>
+            <a:ext cx="2435450" cy="1268900"/>
+            <a:chOff x="4578109" y="4686155"/>
+            <a:chExt cx="2435450" cy="1268900"/>
+          </a:xfrm>
+          <a:solidFill>
+            <a:srgbClr val="ECDDF5"/>
+          </a:solidFill>
         </p:grpSpPr>
         <p:sp>
           <p:nvSpPr>
@@ -4908,15 +5090,13 @@
           </p:nvSpPr>
           <p:spPr>
             <a:xfrm>
-              <a:off x="4545233" y="4698342"/>
-              <a:ext cx="2420714" cy="461665"/>
+              <a:off x="4578109" y="4686155"/>
+              <a:ext cx="2435450" cy="461665"/>
             </a:xfrm>
             <a:prstGeom prst="rect">
               <a:avLst/>
             </a:prstGeom>
-            <a:solidFill>
-              <a:srgbClr val="FEF1E8"/>
-            </a:solidFill>
+            <a:grpFill/>
           </p:spPr>
           <p:txBody>
             <a:bodyPr wrap="square" rtlCol="0">
@@ -4927,7 +5107,7 @@
               <a:pPr algn="ctr"/>
               <a:r>
                 <a:rPr lang="en-US" sz="2400" dirty="0">
-                  <a:latin typeface="Freestyle Script" panose="030804020302050B0404" pitchFamily="66" charset="0"/>
+                  <a:latin typeface="Brush Script MT" panose="03060802040406070304" pitchFamily="66" charset="0"/>
                 </a:rPr>
                 <a:t>Talia Moretty</a:t>
               </a:r>
@@ -4948,13 +5128,13 @@
           </p:nvSpPr>
           <p:spPr>
             <a:xfrm>
-              <a:off x="4545233" y="5067674"/>
-              <a:ext cx="2437565" cy="1323439"/>
+              <a:off x="4639416" y="5031725"/>
+              <a:ext cx="2352801" cy="923330"/>
             </a:xfrm>
             <a:prstGeom prst="rect">
               <a:avLst/>
             </a:prstGeom>
-            <a:noFill/>
+            <a:grpFill/>
           </p:spPr>
           <p:txBody>
             <a:bodyPr wrap="square" rtlCol="0">
@@ -4963,26 +5143,18 @@
             <a:lstStyle/>
             <a:p>
               <a:r>
-                <a:rPr lang="en-US" sz="2000" u="sng" dirty="0">
-                  <a:latin typeface="Freestyle Script" panose="030804020302050B0404" pitchFamily="66" charset="0"/>
+                <a:rPr lang="en-US" u="sng" dirty="0">
+                  <a:latin typeface="Brush Script MT" panose="03060802040406070304" pitchFamily="66" charset="0"/>
                 </a:rPr>
                 <a:t>Favorite Cake:</a:t>
               </a:r>
             </a:p>
             <a:p>
               <a:r>
-                <a:rPr lang="en-US" sz="2000" dirty="0">
-                  <a:latin typeface="Freestyle Script" panose="030804020302050B0404" pitchFamily="66" charset="0"/>
+                <a:rPr lang="en-US" dirty="0">
+                  <a:latin typeface="Brush Script MT" panose="03060802040406070304" pitchFamily="66" charset="0"/>
                 </a:rPr>
                 <a:t>Yellow cake with chocolate frosting </a:t>
-              </a:r>
-            </a:p>
-            <a:p>
-              <a:r>
-                <a:rPr lang="en-US" sz="2000" u="sng" dirty="0">
-                  <a:latin typeface="Freestyle Script" panose="030804020302050B0404" pitchFamily="66" charset="0"/>
-                </a:rPr>
-                <a:t>Other info:</a:t>
               </a:r>
             </a:p>
           </p:txBody>
@@ -5002,13 +5174,15 @@
         </p:nvSpPr>
         <p:spPr>
           <a:xfrm>
-            <a:off x="10679476" y="396562"/>
+            <a:off x="10030688" y="452430"/>
             <a:ext cx="465331" cy="462704"/>
           </a:xfrm>
           <a:prstGeom prst="plus">
             <a:avLst/>
           </a:prstGeom>
-          <a:noFill/>
+          <a:solidFill>
+            <a:srgbClr val="DDDDDD"/>
+          </a:solidFill>
           <a:ln w="38100" cap="flat" cmpd="sng" algn="ctr">
             <a:solidFill>
               <a:schemeClr val="dk1"/>
@@ -5038,7 +5212,14 @@
           <a:lstStyle/>
           <a:p>
             <a:pPr algn="ctr"/>
-            <a:endParaRPr lang="en-US" dirty="0"/>
+            <a:endParaRPr lang="en-US" dirty="0">
+              <a:solidFill>
+                <a:srgbClr val="ECDDF5"/>
+              </a:solidFill>
+              <a:highlight>
+                <a:srgbClr val="ECDDF5"/>
+              </a:highlight>
+            </a:endParaRPr>
           </a:p>
         </p:txBody>
       </p:sp>
@@ -5056,7 +5237,7 @@
         </p:nvSpPr>
         <p:spPr>
           <a:xfrm>
-            <a:off x="1868117" y="1547644"/>
+            <a:off x="1696587" y="1482031"/>
             <a:ext cx="10254824" cy="769441"/>
           </a:xfrm>
           <a:prstGeom prst="rect">
@@ -5124,100 +5305,12 @@
           </a:p>
         </p:txBody>
       </p:sp>
-      <p:sp>
-        <p:nvSpPr>
-          <p:cNvPr id="92" name="Flowchart: Delay 91">
+      <p:grpSp>
+        <p:nvGrpSpPr>
+          <p:cNvPr id="130" name="Group 129">
             <a:extLst>
               <a:ext uri="{FF2B5EF4-FFF2-40B4-BE49-F238E27FC236}">
-                <a16:creationId xmlns:a16="http://schemas.microsoft.com/office/drawing/2014/main" id="{537384D6-E7F9-4A30-9880-D54980459F56}"/>
-              </a:ext>
-            </a:extLst>
-          </p:cNvPr>
-          <p:cNvSpPr/>
-          <p:nvPr/>
-        </p:nvSpPr>
-        <p:spPr>
-          <a:xfrm rot="5400000">
-            <a:off x="1024598" y="2075111"/>
-            <a:ext cx="81858" cy="131878"/>
-          </a:xfrm>
-          <a:prstGeom prst="flowChartDelay">
-            <a:avLst/>
-          </a:prstGeom>
-        </p:spPr>
-        <p:style>
-          <a:lnRef idx="2">
-            <a:schemeClr val="dk1"/>
-          </a:lnRef>
-          <a:fillRef idx="1">
-            <a:schemeClr val="lt1"/>
-          </a:fillRef>
-          <a:effectRef idx="0">
-            <a:schemeClr val="dk1"/>
-          </a:effectRef>
-          <a:fontRef idx="minor">
-            <a:schemeClr val="dk1"/>
-          </a:fontRef>
-        </p:style>
-        <p:txBody>
-          <a:bodyPr rtlCol="0" anchor="ctr"/>
-          <a:lstStyle/>
-          <a:p>
-            <a:pPr algn="ctr"/>
-            <a:endParaRPr lang="en-US" dirty="0"/>
-          </a:p>
-        </p:txBody>
-      </p:sp>
-      <p:sp>
-        <p:nvSpPr>
-          <p:cNvPr id="93" name="Flowchart: Delay 92">
-            <a:extLst>
-              <a:ext uri="{FF2B5EF4-FFF2-40B4-BE49-F238E27FC236}">
-                <a16:creationId xmlns:a16="http://schemas.microsoft.com/office/drawing/2014/main" id="{D6B7E424-93F0-43D9-A00A-AE38077D1741}"/>
-              </a:ext>
-            </a:extLst>
-          </p:cNvPr>
-          <p:cNvSpPr/>
-          <p:nvPr/>
-        </p:nvSpPr>
-        <p:spPr>
-          <a:xfrm rot="5400000">
-            <a:off x="770537" y="2075111"/>
-            <a:ext cx="81858" cy="131878"/>
-          </a:xfrm>
-          <a:prstGeom prst="flowChartDelay">
-            <a:avLst/>
-          </a:prstGeom>
-        </p:spPr>
-        <p:style>
-          <a:lnRef idx="2">
-            <a:schemeClr val="dk1"/>
-          </a:lnRef>
-          <a:fillRef idx="1">
-            <a:schemeClr val="lt1"/>
-          </a:fillRef>
-          <a:effectRef idx="0">
-            <a:schemeClr val="dk1"/>
-          </a:effectRef>
-          <a:fontRef idx="minor">
-            <a:schemeClr val="dk1"/>
-          </a:fontRef>
-        </p:style>
-        <p:txBody>
-          <a:bodyPr rtlCol="0" anchor="ctr"/>
-          <a:lstStyle/>
-          <a:p>
-            <a:pPr algn="ctr"/>
-            <a:endParaRPr lang="en-US" dirty="0"/>
-          </a:p>
-        </p:txBody>
-      </p:sp>
-      <p:grpSp>
-        <p:nvGrpSpPr>
-          <p:cNvPr id="105" name="Group 104">
-            <a:extLst>
-              <a:ext uri="{FF2B5EF4-FFF2-40B4-BE49-F238E27FC236}">
-                <a16:creationId xmlns:a16="http://schemas.microsoft.com/office/drawing/2014/main" id="{83A525BC-D066-465F-A942-AA72A1DA23B4}"/>
+                <a16:creationId xmlns:a16="http://schemas.microsoft.com/office/drawing/2014/main" id="{54CE5B95-E263-4C3A-B2C9-E1AEC8F9C8F6}"/>
               </a:ext>
             </a:extLst>
           </p:cNvPr>
@@ -5226,18 +5319,18 @@
         </p:nvGrpSpPr>
         <p:grpSpPr>
           <a:xfrm>
-            <a:off x="627303" y="2329400"/>
-            <a:ext cx="614110" cy="281229"/>
-            <a:chOff x="629843" y="2326860"/>
-            <a:chExt cx="614110" cy="281229"/>
+            <a:off x="627303" y="2100121"/>
+            <a:ext cx="614110" cy="510508"/>
+            <a:chOff x="627303" y="2100121"/>
+            <a:chExt cx="614110" cy="510508"/>
           </a:xfrm>
         </p:grpSpPr>
         <p:sp>
           <p:nvSpPr>
-            <p:cNvPr id="41" name="Rectangle 40">
+            <p:cNvPr id="92" name="Flowchart: Delay 91">
               <a:extLst>
                 <a:ext uri="{FF2B5EF4-FFF2-40B4-BE49-F238E27FC236}">
-                  <a16:creationId xmlns:a16="http://schemas.microsoft.com/office/drawing/2014/main" id="{2450F09E-7C17-4116-8C58-BC8CDCBE1BB4}"/>
+                  <a16:creationId xmlns:a16="http://schemas.microsoft.com/office/drawing/2014/main" id="{537384D6-E7F9-4A30-9880-D54980459F56}"/>
                 </a:ext>
               </a:extLst>
             </p:cNvPr>
@@ -5245,54 +5338,88 @@
             <p:nvPr/>
           </p:nvSpPr>
           <p:spPr>
-            <a:xfrm>
-              <a:off x="629843" y="2326860"/>
-              <a:ext cx="614110" cy="281229"/>
+            <a:xfrm rot="5400000">
+              <a:off x="1024598" y="2075111"/>
+              <a:ext cx="81858" cy="131878"/>
             </a:xfrm>
-            <a:prstGeom prst="rect">
+            <a:prstGeom prst="flowChartDelay">
               <a:avLst/>
             </a:prstGeom>
-            <a:solidFill>
-              <a:srgbClr val="FEF1E8"/>
-            </a:solidFill>
-            <a:ln>
-              <a:noFill/>
-            </a:ln>
           </p:spPr>
           <p:style>
             <a:lnRef idx="2">
-              <a:schemeClr val="accent1">
-                <a:shade val="50000"/>
-              </a:schemeClr>
+              <a:schemeClr val="dk1"/>
             </a:lnRef>
             <a:fillRef idx="1">
-              <a:schemeClr val="accent1"/>
+              <a:schemeClr val="lt1"/>
             </a:fillRef>
             <a:effectRef idx="0">
-              <a:schemeClr val="accent1"/>
+              <a:schemeClr val="dk1"/>
             </a:effectRef>
             <a:fontRef idx="minor">
-              <a:schemeClr val="lt1"/>
+              <a:schemeClr val="dk1"/>
             </a:fontRef>
           </p:style>
           <p:txBody>
             <a:bodyPr rtlCol="0" anchor="ctr"/>
             <a:lstStyle/>
             <a:p>
-              <a:endParaRPr lang="en-US" dirty="0">
-                <a:solidFill>
-                  <a:srgbClr val="B56354"/>
-                </a:solidFill>
-              </a:endParaRPr>
+              <a:pPr algn="ctr"/>
+              <a:endParaRPr lang="en-US" dirty="0"/>
+            </a:p>
+          </p:txBody>
+        </p:sp>
+        <p:sp>
+          <p:nvSpPr>
+            <p:cNvPr id="93" name="Flowchart: Delay 92">
+              <a:extLst>
+                <a:ext uri="{FF2B5EF4-FFF2-40B4-BE49-F238E27FC236}">
+                  <a16:creationId xmlns:a16="http://schemas.microsoft.com/office/drawing/2014/main" id="{D6B7E424-93F0-43D9-A00A-AE38077D1741}"/>
+                </a:ext>
+              </a:extLst>
+            </p:cNvPr>
+            <p:cNvSpPr/>
+            <p:nvPr/>
+          </p:nvSpPr>
+          <p:spPr>
+            <a:xfrm rot="5400000">
+              <a:off x="770537" y="2075111"/>
+              <a:ext cx="81858" cy="131878"/>
+            </a:xfrm>
+            <a:prstGeom prst="flowChartDelay">
+              <a:avLst/>
+            </a:prstGeom>
+            <a:ln/>
+          </p:spPr>
+          <p:style>
+            <a:lnRef idx="2">
+              <a:schemeClr val="dk1"/>
+            </a:lnRef>
+            <a:fillRef idx="1">
+              <a:schemeClr val="lt1"/>
+            </a:fillRef>
+            <a:effectRef idx="0">
+              <a:schemeClr val="dk1"/>
+            </a:effectRef>
+            <a:fontRef idx="minor">
+              <a:schemeClr val="dk1"/>
+            </a:fontRef>
+          </p:style>
+          <p:txBody>
+            <a:bodyPr rtlCol="0" anchor="ctr"/>
+            <a:lstStyle/>
+            <a:p>
+              <a:pPr algn="ctr"/>
+              <a:endParaRPr lang="en-US" dirty="0"/>
             </a:p>
           </p:txBody>
         </p:sp>
         <p:grpSp>
           <p:nvGrpSpPr>
-            <p:cNvPr id="95" name="Group 94">
+            <p:cNvPr id="105" name="Group 104">
               <a:extLst>
                 <a:ext uri="{FF2B5EF4-FFF2-40B4-BE49-F238E27FC236}">
-                  <a16:creationId xmlns:a16="http://schemas.microsoft.com/office/drawing/2014/main" id="{C01CC1B1-987E-41FA-8BB9-FAC37FFB101E}"/>
+                  <a16:creationId xmlns:a16="http://schemas.microsoft.com/office/drawing/2014/main" id="{83A525BC-D066-465F-A942-AA72A1DA23B4}"/>
                 </a:ext>
               </a:extLst>
             </p:cNvPr>
@@ -5301,18 +5428,226 @@
           </p:nvGrpSpPr>
           <p:grpSpPr>
             <a:xfrm>
-              <a:off x="629843" y="2328468"/>
-              <a:ext cx="373946" cy="83106"/>
-              <a:chOff x="738463" y="2100121"/>
-              <a:chExt cx="373946" cy="83106"/>
+              <a:off x="627303" y="2329400"/>
+              <a:ext cx="614110" cy="281229"/>
+              <a:chOff x="629843" y="2326860"/>
+              <a:chExt cx="614110" cy="281229"/>
             </a:xfrm>
           </p:grpSpPr>
           <p:sp>
             <p:nvSpPr>
-              <p:cNvPr id="96" name="Flowchart: Delay 95">
+              <p:cNvPr id="41" name="Rectangle 40">
                 <a:extLst>
                   <a:ext uri="{FF2B5EF4-FFF2-40B4-BE49-F238E27FC236}">
-                    <a16:creationId xmlns:a16="http://schemas.microsoft.com/office/drawing/2014/main" id="{E51DAD41-D391-42B0-BA43-A428CB0AFD84}"/>
+                    <a16:creationId xmlns:a16="http://schemas.microsoft.com/office/drawing/2014/main" id="{2450F09E-7C17-4116-8C58-BC8CDCBE1BB4}"/>
+                  </a:ext>
+                </a:extLst>
+              </p:cNvPr>
+              <p:cNvSpPr/>
+              <p:nvPr/>
+            </p:nvSpPr>
+            <p:spPr>
+              <a:xfrm>
+                <a:off x="629843" y="2326860"/>
+                <a:ext cx="614110" cy="281229"/>
+              </a:xfrm>
+              <a:prstGeom prst="rect">
+                <a:avLst/>
+              </a:prstGeom>
+              <a:solidFill>
+                <a:srgbClr val="FEF1E8"/>
+              </a:solidFill>
+              <a:ln>
+                <a:noFill/>
+              </a:ln>
+            </p:spPr>
+            <p:style>
+              <a:lnRef idx="2">
+                <a:schemeClr val="accent1">
+                  <a:shade val="50000"/>
+                </a:schemeClr>
+              </a:lnRef>
+              <a:fillRef idx="1">
+                <a:schemeClr val="accent1"/>
+              </a:fillRef>
+              <a:effectRef idx="0">
+                <a:schemeClr val="accent1"/>
+              </a:effectRef>
+              <a:fontRef idx="minor">
+                <a:schemeClr val="lt1"/>
+              </a:fontRef>
+            </p:style>
+            <p:txBody>
+              <a:bodyPr rtlCol="0" anchor="ctr"/>
+              <a:lstStyle/>
+              <a:p>
+                <a:endParaRPr lang="en-US" dirty="0">
+                  <a:solidFill>
+                    <a:srgbClr val="B56354"/>
+                  </a:solidFill>
+                </a:endParaRPr>
+              </a:p>
+            </p:txBody>
+          </p:sp>
+          <p:grpSp>
+            <p:nvGrpSpPr>
+              <p:cNvPr id="95" name="Group 94">
+                <a:extLst>
+                  <a:ext uri="{FF2B5EF4-FFF2-40B4-BE49-F238E27FC236}">
+                    <a16:creationId xmlns:a16="http://schemas.microsoft.com/office/drawing/2014/main" id="{C01CC1B1-987E-41FA-8BB9-FAC37FFB101E}"/>
+                  </a:ext>
+                </a:extLst>
+              </p:cNvPr>
+              <p:cNvGrpSpPr/>
+              <p:nvPr/>
+            </p:nvGrpSpPr>
+            <p:grpSpPr>
+              <a:xfrm>
+                <a:off x="629843" y="2328468"/>
+                <a:ext cx="373946" cy="83106"/>
+                <a:chOff x="738463" y="2100121"/>
+                <a:chExt cx="373946" cy="83106"/>
+              </a:xfrm>
+            </p:grpSpPr>
+            <p:sp>
+              <p:nvSpPr>
+                <p:cNvPr id="96" name="Flowchart: Delay 95">
+                  <a:extLst>
+                    <a:ext uri="{FF2B5EF4-FFF2-40B4-BE49-F238E27FC236}">
+                      <a16:creationId xmlns:a16="http://schemas.microsoft.com/office/drawing/2014/main" id="{E51DAD41-D391-42B0-BA43-A428CB0AFD84}"/>
+                    </a:ext>
+                  </a:extLst>
+                </p:cNvPr>
+                <p:cNvSpPr/>
+                <p:nvPr/>
+              </p:nvSpPr>
+              <p:spPr>
+                <a:xfrm rot="5400000">
+                  <a:off x="874812" y="2090681"/>
+                  <a:ext cx="81858" cy="103234"/>
+                </a:xfrm>
+                <a:prstGeom prst="flowChartDelay">
+                  <a:avLst/>
+                </a:prstGeom>
+              </p:spPr>
+              <p:style>
+                <a:lnRef idx="2">
+                  <a:schemeClr val="dk1"/>
+                </a:lnRef>
+                <a:fillRef idx="1">
+                  <a:schemeClr val="lt1"/>
+                </a:fillRef>
+                <a:effectRef idx="0">
+                  <a:schemeClr val="dk1"/>
+                </a:effectRef>
+                <a:fontRef idx="minor">
+                  <a:schemeClr val="dk1"/>
+                </a:fontRef>
+              </p:style>
+              <p:txBody>
+                <a:bodyPr rtlCol="0" anchor="ctr"/>
+                <a:lstStyle/>
+                <a:p>
+                  <a:pPr algn="ctr"/>
+                  <a:endParaRPr lang="en-US" dirty="0"/>
+                </a:p>
+              </p:txBody>
+            </p:sp>
+            <p:sp>
+              <p:nvSpPr>
+                <p:cNvPr id="97" name="Flowchart: Delay 96">
+                  <a:extLst>
+                    <a:ext uri="{FF2B5EF4-FFF2-40B4-BE49-F238E27FC236}">
+                      <a16:creationId xmlns:a16="http://schemas.microsoft.com/office/drawing/2014/main" id="{15B20213-0119-4EF7-B374-304E8DE34546}"/>
+                    </a:ext>
+                  </a:extLst>
+                </p:cNvPr>
+                <p:cNvSpPr/>
+                <p:nvPr/>
+              </p:nvSpPr>
+              <p:spPr>
+                <a:xfrm rot="5400000">
+                  <a:off x="1005541" y="2075456"/>
+                  <a:ext cx="81858" cy="131878"/>
+                </a:xfrm>
+                <a:prstGeom prst="flowChartDelay">
+                  <a:avLst/>
+                </a:prstGeom>
+              </p:spPr>
+              <p:style>
+                <a:lnRef idx="2">
+                  <a:schemeClr val="dk1"/>
+                </a:lnRef>
+                <a:fillRef idx="1">
+                  <a:schemeClr val="lt1"/>
+                </a:fillRef>
+                <a:effectRef idx="0">
+                  <a:schemeClr val="dk1"/>
+                </a:effectRef>
+                <a:fontRef idx="minor">
+                  <a:schemeClr val="dk1"/>
+                </a:fontRef>
+              </p:style>
+              <p:txBody>
+                <a:bodyPr rtlCol="0" anchor="ctr"/>
+                <a:lstStyle/>
+                <a:p>
+                  <a:pPr algn="ctr"/>
+                  <a:endParaRPr lang="en-US" dirty="0"/>
+                </a:p>
+              </p:txBody>
+            </p:sp>
+            <p:sp>
+              <p:nvSpPr>
+                <p:cNvPr id="98" name="Flowchart: Delay 97">
+                  <a:extLst>
+                    <a:ext uri="{FF2B5EF4-FFF2-40B4-BE49-F238E27FC236}">
+                      <a16:creationId xmlns:a16="http://schemas.microsoft.com/office/drawing/2014/main" id="{0E2EF1D7-C026-4306-9E88-22D88EBC0C86}"/>
+                    </a:ext>
+                  </a:extLst>
+                </p:cNvPr>
+                <p:cNvSpPr/>
+                <p:nvPr/>
+              </p:nvSpPr>
+              <p:spPr>
+                <a:xfrm rot="5400000">
+                  <a:off x="755376" y="2083208"/>
+                  <a:ext cx="81858" cy="115684"/>
+                </a:xfrm>
+                <a:prstGeom prst="flowChartDelay">
+                  <a:avLst/>
+                </a:prstGeom>
+              </p:spPr>
+              <p:style>
+                <a:lnRef idx="2">
+                  <a:schemeClr val="dk1"/>
+                </a:lnRef>
+                <a:fillRef idx="1">
+                  <a:schemeClr val="lt1"/>
+                </a:fillRef>
+                <a:effectRef idx="0">
+                  <a:schemeClr val="dk1"/>
+                </a:effectRef>
+                <a:fontRef idx="minor">
+                  <a:schemeClr val="dk1"/>
+                </a:fontRef>
+              </p:style>
+              <p:txBody>
+                <a:bodyPr rtlCol="0" anchor="ctr"/>
+                <a:lstStyle/>
+                <a:p>
+                  <a:pPr algn="ctr"/>
+                  <a:endParaRPr lang="en-US" dirty="0"/>
+                </a:p>
+              </p:txBody>
+            </p:sp>
+          </p:grpSp>
+          <p:sp>
+            <p:nvSpPr>
+              <p:cNvPr id="103" name="Flowchart: Delay 102">
+                <a:extLst>
+                  <a:ext uri="{FF2B5EF4-FFF2-40B4-BE49-F238E27FC236}">
+                    <a16:creationId xmlns:a16="http://schemas.microsoft.com/office/drawing/2014/main" id="{7841C648-3459-4ECA-97CD-05D93952801E}"/>
                   </a:ext>
                 </a:extLst>
               </p:cNvPr>
@@ -5321,7 +5656,7 @@
             </p:nvSpPr>
             <p:spPr>
               <a:xfrm rot="5400000">
-                <a:off x="874812" y="2090681"/>
+                <a:off x="1027571" y="2319433"/>
                 <a:ext cx="81858" cy="103234"/>
               </a:xfrm>
               <a:prstGeom prst="flowChartDelay">
@@ -5353,10 +5688,10 @@
           </p:sp>
           <p:sp>
             <p:nvSpPr>
-              <p:cNvPr id="97" name="Flowchart: Delay 96">
+              <p:cNvPr id="104" name="Flowchart: Delay 103">
                 <a:extLst>
                   <a:ext uri="{FF2B5EF4-FFF2-40B4-BE49-F238E27FC236}">
-                    <a16:creationId xmlns:a16="http://schemas.microsoft.com/office/drawing/2014/main" id="{15B20213-0119-4EF7-B374-304E8DE34546}"/>
+                    <a16:creationId xmlns:a16="http://schemas.microsoft.com/office/drawing/2014/main" id="{5D3D53C4-272E-4164-B2F3-E79212CF61FC}"/>
                   </a:ext>
                 </a:extLst>
               </p:cNvPr>
@@ -5365,52 +5700,8 @@
             </p:nvSpPr>
             <p:spPr>
               <a:xfrm rot="5400000">
-                <a:off x="1005541" y="2075456"/>
-                <a:ext cx="81858" cy="131878"/>
-              </a:xfrm>
-              <a:prstGeom prst="flowChartDelay">
-                <a:avLst/>
-              </a:prstGeom>
-            </p:spPr>
-            <p:style>
-              <a:lnRef idx="2">
-                <a:schemeClr val="dk1"/>
-              </a:lnRef>
-              <a:fillRef idx="1">
-                <a:schemeClr val="lt1"/>
-              </a:fillRef>
-              <a:effectRef idx="0">
-                <a:schemeClr val="dk1"/>
-              </a:effectRef>
-              <a:fontRef idx="minor">
-                <a:schemeClr val="dk1"/>
-              </a:fontRef>
-            </p:style>
-            <p:txBody>
-              <a:bodyPr rtlCol="0" anchor="ctr"/>
-              <a:lstStyle/>
-              <a:p>
-                <a:pPr algn="ctr"/>
-                <a:endParaRPr lang="en-US" dirty="0"/>
-              </a:p>
-            </p:txBody>
-          </p:sp>
-          <p:sp>
-            <p:nvSpPr>
-              <p:cNvPr id="98" name="Flowchart: Delay 97">
-                <a:extLst>
-                  <a:ext uri="{FF2B5EF4-FFF2-40B4-BE49-F238E27FC236}">
-                    <a16:creationId xmlns:a16="http://schemas.microsoft.com/office/drawing/2014/main" id="{0E2EF1D7-C026-4306-9E88-22D88EBC0C86}"/>
-                  </a:ext>
-                </a:extLst>
-              </p:cNvPr>
-              <p:cNvSpPr/>
-              <p:nvPr/>
-            </p:nvSpPr>
-            <p:spPr>
-              <a:xfrm rot="5400000">
-                <a:off x="755376" y="2083208"/>
-                <a:ext cx="81858" cy="115684"/>
+                <a:off x="1144608" y="2312152"/>
+                <a:ext cx="81858" cy="116831"/>
               </a:xfrm>
               <a:prstGeom prst="flowChartDelay">
                 <a:avLst/>
@@ -5440,94 +5731,6 @@
             </p:txBody>
           </p:sp>
         </p:grpSp>
-        <p:sp>
-          <p:nvSpPr>
-            <p:cNvPr id="103" name="Flowchart: Delay 102">
-              <a:extLst>
-                <a:ext uri="{FF2B5EF4-FFF2-40B4-BE49-F238E27FC236}">
-                  <a16:creationId xmlns:a16="http://schemas.microsoft.com/office/drawing/2014/main" id="{7841C648-3459-4ECA-97CD-05D93952801E}"/>
-                </a:ext>
-              </a:extLst>
-            </p:cNvPr>
-            <p:cNvSpPr/>
-            <p:nvPr/>
-          </p:nvSpPr>
-          <p:spPr>
-            <a:xfrm rot="5400000">
-              <a:off x="1027571" y="2319433"/>
-              <a:ext cx="81858" cy="103234"/>
-            </a:xfrm>
-            <a:prstGeom prst="flowChartDelay">
-              <a:avLst/>
-            </a:prstGeom>
-          </p:spPr>
-          <p:style>
-            <a:lnRef idx="2">
-              <a:schemeClr val="dk1"/>
-            </a:lnRef>
-            <a:fillRef idx="1">
-              <a:schemeClr val="lt1"/>
-            </a:fillRef>
-            <a:effectRef idx="0">
-              <a:schemeClr val="dk1"/>
-            </a:effectRef>
-            <a:fontRef idx="minor">
-              <a:schemeClr val="dk1"/>
-            </a:fontRef>
-          </p:style>
-          <p:txBody>
-            <a:bodyPr rtlCol="0" anchor="ctr"/>
-            <a:lstStyle/>
-            <a:p>
-              <a:pPr algn="ctr"/>
-              <a:endParaRPr lang="en-US" dirty="0"/>
-            </a:p>
-          </p:txBody>
-        </p:sp>
-        <p:sp>
-          <p:nvSpPr>
-            <p:cNvPr id="104" name="Flowchart: Delay 103">
-              <a:extLst>
-                <a:ext uri="{FF2B5EF4-FFF2-40B4-BE49-F238E27FC236}">
-                  <a16:creationId xmlns:a16="http://schemas.microsoft.com/office/drawing/2014/main" id="{5D3D53C4-272E-4164-B2F3-E79212CF61FC}"/>
-                </a:ext>
-              </a:extLst>
-            </p:cNvPr>
-            <p:cNvSpPr/>
-            <p:nvPr/>
-          </p:nvSpPr>
-          <p:spPr>
-            <a:xfrm rot="5400000">
-              <a:off x="1144608" y="2312152"/>
-              <a:ext cx="81858" cy="116831"/>
-            </a:xfrm>
-            <a:prstGeom prst="flowChartDelay">
-              <a:avLst/>
-            </a:prstGeom>
-          </p:spPr>
-          <p:style>
-            <a:lnRef idx="2">
-              <a:schemeClr val="dk1"/>
-            </a:lnRef>
-            <a:fillRef idx="1">
-              <a:schemeClr val="lt1"/>
-            </a:fillRef>
-            <a:effectRef idx="0">
-              <a:schemeClr val="dk1"/>
-            </a:effectRef>
-            <a:fontRef idx="minor">
-              <a:schemeClr val="dk1"/>
-            </a:fontRef>
-          </p:style>
-          <p:txBody>
-            <a:bodyPr rtlCol="0" anchor="ctr"/>
-            <a:lstStyle/>
-            <a:p>
-              <a:pPr algn="ctr"/>
-              <a:endParaRPr lang="en-US" dirty="0"/>
-            </a:p>
-          </p:txBody>
-        </p:sp>
       </p:grpSp>
       <p:sp>
         <p:nvSpPr>
@@ -5975,14 +6178,14 @@
         </p:nvSpPr>
         <p:spPr>
           <a:xfrm>
-            <a:off x="1951566" y="4720113"/>
+            <a:off x="1957808" y="4720113"/>
             <a:ext cx="2420714" cy="461665"/>
           </a:xfrm>
           <a:prstGeom prst="rect">
             <a:avLst/>
           </a:prstGeom>
           <a:solidFill>
-            <a:srgbClr val="FEF1E8"/>
+            <a:srgbClr val="ECDDF5"/>
           </a:solidFill>
         </p:spPr>
         <p:txBody>
@@ -5994,7 +6197,7 @@
             <a:pPr algn="ctr"/>
             <a:r>
               <a:rPr lang="en-US" sz="2400" dirty="0">
-                <a:latin typeface="Freestyle Script" panose="030804020302050B0404" pitchFamily="66" charset="0"/>
+                <a:latin typeface="Brush Script MT" panose="03060802040406070304" pitchFamily="66" charset="0"/>
               </a:rPr>
               <a:t>Amanda Crawford</a:t>
             </a:r>
@@ -6037,6 +6240,502 @@
           </a:fontRef>
         </p:style>
       </p:cxnSp>
+      <p:cxnSp>
+        <p:nvCxnSpPr>
+          <p:cNvPr id="135" name="Straight Connector 134">
+            <a:extLst>
+              <a:ext uri="{FF2B5EF4-FFF2-40B4-BE49-F238E27FC236}">
+                <a16:creationId xmlns:a16="http://schemas.microsoft.com/office/drawing/2014/main" id="{ACBFFE84-45B4-4FF0-826F-503E6BD44757}"/>
+              </a:ext>
+            </a:extLst>
+          </p:cNvPr>
+          <p:cNvCxnSpPr/>
+          <p:nvPr/>
+        </p:nvCxnSpPr>
+        <p:spPr>
+          <a:xfrm>
+            <a:off x="7096996" y="4721765"/>
+            <a:ext cx="2454416" cy="0"/>
+          </a:xfrm>
+          <a:prstGeom prst="line">
+            <a:avLst/>
+          </a:prstGeom>
+        </p:spPr>
+        <p:style>
+          <a:lnRef idx="3">
+            <a:schemeClr val="dk1"/>
+          </a:lnRef>
+          <a:fillRef idx="0">
+            <a:schemeClr val="dk1"/>
+          </a:fillRef>
+          <a:effectRef idx="2">
+            <a:schemeClr val="dk1"/>
+          </a:effectRef>
+          <a:fontRef idx="minor">
+            <a:schemeClr val="tx1"/>
+          </a:fontRef>
+        </p:style>
+      </p:cxnSp>
+      <p:cxnSp>
+        <p:nvCxnSpPr>
+          <p:cNvPr id="136" name="Straight Connector 135">
+            <a:extLst>
+              <a:ext uri="{FF2B5EF4-FFF2-40B4-BE49-F238E27FC236}">
+                <a16:creationId xmlns:a16="http://schemas.microsoft.com/office/drawing/2014/main" id="{C1C01F6C-1142-4202-B4BA-A6C560765270}"/>
+              </a:ext>
+            </a:extLst>
+          </p:cNvPr>
+          <p:cNvCxnSpPr/>
+          <p:nvPr/>
+        </p:nvCxnSpPr>
+        <p:spPr>
+          <a:xfrm>
+            <a:off x="9668525" y="4721765"/>
+            <a:ext cx="2454416" cy="0"/>
+          </a:xfrm>
+          <a:prstGeom prst="line">
+            <a:avLst/>
+          </a:prstGeom>
+        </p:spPr>
+        <p:style>
+          <a:lnRef idx="3">
+            <a:schemeClr val="dk1"/>
+          </a:lnRef>
+          <a:fillRef idx="0">
+            <a:schemeClr val="dk1"/>
+          </a:fillRef>
+          <a:effectRef idx="2">
+            <a:schemeClr val="dk1"/>
+          </a:effectRef>
+          <a:fontRef idx="minor">
+            <a:schemeClr val="tx1"/>
+          </a:fontRef>
+        </p:style>
+      </p:cxnSp>
+      <p:sp>
+        <p:nvSpPr>
+          <p:cNvPr id="138" name="Rectangle: Rounded Corners 137">
+            <a:extLst>
+              <a:ext uri="{FF2B5EF4-FFF2-40B4-BE49-F238E27FC236}">
+                <a16:creationId xmlns:a16="http://schemas.microsoft.com/office/drawing/2014/main" id="{4F3982E8-06C0-415D-834C-2D302625BC3B}"/>
+              </a:ext>
+            </a:extLst>
+          </p:cNvPr>
+          <p:cNvSpPr/>
+          <p:nvPr/>
+        </p:nvSpPr>
+        <p:spPr>
+          <a:xfrm>
+            <a:off x="4524144" y="2310215"/>
+            <a:ext cx="2443530" cy="4337720"/>
+          </a:xfrm>
+          <a:prstGeom prst="roundRect">
+            <a:avLst/>
+          </a:prstGeom>
+          <a:noFill/>
+          <a:ln w="19050" cap="flat" cmpd="sng" algn="ctr">
+            <a:solidFill>
+              <a:schemeClr val="dk1"/>
+            </a:solidFill>
+            <a:prstDash val="solid"/>
+            <a:round/>
+            <a:headEnd type="none" w="med" len="med"/>
+            <a:tailEnd type="none" w="med" len="med"/>
+          </a:ln>
+        </p:spPr>
+        <p:style>
+          <a:lnRef idx="0">
+            <a:scrgbClr r="0" g="0" b="0"/>
+          </a:lnRef>
+          <a:fillRef idx="0">
+            <a:scrgbClr r="0" g="0" b="0"/>
+          </a:fillRef>
+          <a:effectRef idx="0">
+            <a:scrgbClr r="0" g="0" b="0"/>
+          </a:effectRef>
+          <a:fontRef idx="minor">
+            <a:schemeClr val="dk1"/>
+          </a:fontRef>
+        </p:style>
+        <p:txBody>
+          <a:bodyPr rtlCol="0" anchor="ctr"/>
+          <a:lstStyle/>
+          <a:p>
+            <a:pPr algn="ctr"/>
+            <a:endParaRPr lang="en-US"/>
+          </a:p>
+        </p:txBody>
+      </p:sp>
+      <p:sp>
+        <p:nvSpPr>
+          <p:cNvPr id="139" name="Rectangle: Rounded Corners 138">
+            <a:extLst>
+              <a:ext uri="{FF2B5EF4-FFF2-40B4-BE49-F238E27FC236}">
+                <a16:creationId xmlns:a16="http://schemas.microsoft.com/office/drawing/2014/main" id="{551E20B2-9B24-45D9-9A9D-80C3FFC5FBB1}"/>
+              </a:ext>
+            </a:extLst>
+          </p:cNvPr>
+          <p:cNvSpPr/>
+          <p:nvPr/>
+        </p:nvSpPr>
+        <p:spPr>
+          <a:xfrm>
+            <a:off x="1937176" y="2339807"/>
+            <a:ext cx="2461978" cy="4324771"/>
+          </a:xfrm>
+          <a:prstGeom prst="roundRect">
+            <a:avLst/>
+          </a:prstGeom>
+          <a:noFill/>
+          <a:ln w="19050" cap="flat" cmpd="sng" algn="ctr">
+            <a:solidFill>
+              <a:schemeClr val="dk1"/>
+            </a:solidFill>
+            <a:prstDash val="solid"/>
+            <a:round/>
+            <a:headEnd type="none" w="med" len="med"/>
+            <a:tailEnd type="none" w="med" len="med"/>
+          </a:ln>
+        </p:spPr>
+        <p:style>
+          <a:lnRef idx="0">
+            <a:scrgbClr r="0" g="0" b="0"/>
+          </a:lnRef>
+          <a:fillRef idx="0">
+            <a:scrgbClr r="0" g="0" b="0"/>
+          </a:fillRef>
+          <a:effectRef idx="0">
+            <a:scrgbClr r="0" g="0" b="0"/>
+          </a:effectRef>
+          <a:fontRef idx="minor">
+            <a:schemeClr val="dk1"/>
+          </a:fontRef>
+        </p:style>
+        <p:txBody>
+          <a:bodyPr rtlCol="0" anchor="ctr"/>
+          <a:lstStyle/>
+          <a:p>
+            <a:pPr algn="ctr"/>
+            <a:endParaRPr lang="en-US"/>
+          </a:p>
+        </p:txBody>
+      </p:sp>
+      <p:sp>
+        <p:nvSpPr>
+          <p:cNvPr id="140" name="Rectangle: Rounded Corners 139">
+            <a:extLst>
+              <a:ext uri="{FF2B5EF4-FFF2-40B4-BE49-F238E27FC236}">
+                <a16:creationId xmlns:a16="http://schemas.microsoft.com/office/drawing/2014/main" id="{3090962D-BA9C-46C3-9C56-295EB43BEE0E}"/>
+              </a:ext>
+            </a:extLst>
+          </p:cNvPr>
+          <p:cNvSpPr/>
+          <p:nvPr/>
+        </p:nvSpPr>
+        <p:spPr>
+          <a:xfrm>
+            <a:off x="7106203" y="2340509"/>
+            <a:ext cx="2454416" cy="4293775"/>
+          </a:xfrm>
+          <a:prstGeom prst="roundRect">
+            <a:avLst/>
+          </a:prstGeom>
+          <a:noFill/>
+          <a:ln w="19050" cap="flat" cmpd="sng" algn="ctr">
+            <a:solidFill>
+              <a:schemeClr val="dk1"/>
+            </a:solidFill>
+            <a:prstDash val="solid"/>
+            <a:round/>
+            <a:headEnd type="none" w="med" len="med"/>
+            <a:tailEnd type="none" w="med" len="med"/>
+          </a:ln>
+        </p:spPr>
+        <p:style>
+          <a:lnRef idx="0">
+            <a:scrgbClr r="0" g="0" b="0"/>
+          </a:lnRef>
+          <a:fillRef idx="0">
+            <a:scrgbClr r="0" g="0" b="0"/>
+          </a:fillRef>
+          <a:effectRef idx="0">
+            <a:scrgbClr r="0" g="0" b="0"/>
+          </a:effectRef>
+          <a:fontRef idx="minor">
+            <a:schemeClr val="dk1"/>
+          </a:fontRef>
+        </p:style>
+        <p:txBody>
+          <a:bodyPr rtlCol="0" anchor="ctr"/>
+          <a:lstStyle/>
+          <a:p>
+            <a:pPr algn="ctr"/>
+            <a:endParaRPr lang="en-US"/>
+          </a:p>
+        </p:txBody>
+      </p:sp>
+      <p:sp>
+        <p:nvSpPr>
+          <p:cNvPr id="141" name="Rectangle: Rounded Corners 140">
+            <a:extLst>
+              <a:ext uri="{FF2B5EF4-FFF2-40B4-BE49-F238E27FC236}">
+                <a16:creationId xmlns:a16="http://schemas.microsoft.com/office/drawing/2014/main" id="{0CE9F00D-58F3-447B-9A7B-309EE4EAF619}"/>
+              </a:ext>
+            </a:extLst>
+          </p:cNvPr>
+          <p:cNvSpPr/>
+          <p:nvPr/>
+        </p:nvSpPr>
+        <p:spPr>
+          <a:xfrm>
+            <a:off x="9667140" y="2333720"/>
+            <a:ext cx="2461978" cy="4272041"/>
+          </a:xfrm>
+          <a:prstGeom prst="roundRect">
+            <a:avLst/>
+          </a:prstGeom>
+          <a:noFill/>
+          <a:ln w="19050" cap="flat" cmpd="sng" algn="ctr">
+            <a:solidFill>
+              <a:schemeClr val="dk1"/>
+            </a:solidFill>
+            <a:prstDash val="solid"/>
+            <a:round/>
+            <a:headEnd type="none" w="med" len="med"/>
+            <a:tailEnd type="none" w="med" len="med"/>
+          </a:ln>
+        </p:spPr>
+        <p:style>
+          <a:lnRef idx="0">
+            <a:scrgbClr r="0" g="0" b="0"/>
+          </a:lnRef>
+          <a:fillRef idx="0">
+            <a:scrgbClr r="0" g="0" b="0"/>
+          </a:fillRef>
+          <a:effectRef idx="0">
+            <a:scrgbClr r="0" g="0" b="0"/>
+          </a:effectRef>
+          <a:fontRef idx="minor">
+            <a:schemeClr val="dk1"/>
+          </a:fontRef>
+        </p:style>
+        <p:txBody>
+          <a:bodyPr rtlCol="0" anchor="ctr"/>
+          <a:lstStyle/>
+          <a:p>
+            <a:pPr algn="ctr"/>
+            <a:endParaRPr lang="en-US"/>
+          </a:p>
+        </p:txBody>
+      </p:sp>
+      <p:sp>
+        <p:nvSpPr>
+          <p:cNvPr id="142" name="TextBox 141">
+            <a:extLst>
+              <a:ext uri="{FF2B5EF4-FFF2-40B4-BE49-F238E27FC236}">
+                <a16:creationId xmlns:a16="http://schemas.microsoft.com/office/drawing/2014/main" id="{A341A2C3-CFC0-47B1-A087-9976A8C33C79}"/>
+              </a:ext>
+            </a:extLst>
+          </p:cNvPr>
+          <p:cNvSpPr txBox="1"/>
+          <p:nvPr/>
+        </p:nvSpPr>
+        <p:spPr>
+          <a:xfrm>
+            <a:off x="1956971" y="5125304"/>
+            <a:ext cx="2470138" cy="369332"/>
+          </a:xfrm>
+          <a:prstGeom prst="rect">
+            <a:avLst/>
+          </a:prstGeom>
+          <a:noFill/>
+        </p:spPr>
+        <p:txBody>
+          <a:bodyPr wrap="square" rtlCol="0">
+            <a:spAutoFit/>
+          </a:bodyPr>
+          <a:lstStyle/>
+          <a:p>
+            <a:r>
+              <a:rPr lang="en-US" u="sng" dirty="0">
+                <a:latin typeface="Brush Script MT" panose="03060802040406070304" pitchFamily="66" charset="0"/>
+              </a:rPr>
+              <a:t>Favorite Cake:</a:t>
+            </a:r>
+          </a:p>
+        </p:txBody>
+      </p:sp>
+      <p:sp>
+        <p:nvSpPr>
+          <p:cNvPr id="143" name="TextBox 142">
+            <a:extLst>
+              <a:ext uri="{FF2B5EF4-FFF2-40B4-BE49-F238E27FC236}">
+                <a16:creationId xmlns:a16="http://schemas.microsoft.com/office/drawing/2014/main" id="{A3135841-554E-42AE-A29E-5800CD898B22}"/>
+              </a:ext>
+            </a:extLst>
+          </p:cNvPr>
+          <p:cNvSpPr txBox="1"/>
+          <p:nvPr/>
+        </p:nvSpPr>
+        <p:spPr>
+          <a:xfrm>
+            <a:off x="7124053" y="4740888"/>
+            <a:ext cx="2427359" cy="461665"/>
+          </a:xfrm>
+          <a:prstGeom prst="rect">
+            <a:avLst/>
+          </a:prstGeom>
+          <a:noFill/>
+        </p:spPr>
+        <p:txBody>
+          <a:bodyPr wrap="square" rtlCol="0">
+            <a:spAutoFit/>
+          </a:bodyPr>
+          <a:lstStyle/>
+          <a:p>
+            <a:pPr algn="ctr"/>
+            <a:r>
+              <a:rPr lang="en-US" sz="2400" dirty="0">
+                <a:latin typeface="Brush Script MT" panose="03060802040406070304" pitchFamily="66" charset="0"/>
+              </a:rPr>
+              <a:t>Amanda </a:t>
+            </a:r>
+            <a:r>
+              <a:rPr lang="en-US" sz="2400" dirty="0" err="1">
+                <a:latin typeface="Brush Script MT" panose="03060802040406070304" pitchFamily="66" charset="0"/>
+              </a:rPr>
+              <a:t>Dattalo</a:t>
+            </a:r>
+            <a:endParaRPr lang="en-US" sz="2400" dirty="0">
+              <a:latin typeface="Brush Script MT" panose="03060802040406070304" pitchFamily="66" charset="0"/>
+            </a:endParaRPr>
+          </a:p>
+        </p:txBody>
+      </p:sp>
+      <p:sp>
+        <p:nvSpPr>
+          <p:cNvPr id="144" name="TextBox 143">
+            <a:extLst>
+              <a:ext uri="{FF2B5EF4-FFF2-40B4-BE49-F238E27FC236}">
+                <a16:creationId xmlns:a16="http://schemas.microsoft.com/office/drawing/2014/main" id="{37FC9B1F-42CA-4434-B4CF-5B06CCD9644E}"/>
+              </a:ext>
+            </a:extLst>
+          </p:cNvPr>
+          <p:cNvSpPr txBox="1"/>
+          <p:nvPr/>
+        </p:nvSpPr>
+        <p:spPr>
+          <a:xfrm>
+            <a:off x="7132611" y="5122544"/>
+            <a:ext cx="2433467" cy="369332"/>
+          </a:xfrm>
+          <a:prstGeom prst="rect">
+            <a:avLst/>
+          </a:prstGeom>
+          <a:noFill/>
+        </p:spPr>
+        <p:txBody>
+          <a:bodyPr wrap="square" rtlCol="0">
+            <a:spAutoFit/>
+          </a:bodyPr>
+          <a:lstStyle/>
+          <a:p>
+            <a:r>
+              <a:rPr lang="en-US" u="sng" dirty="0">
+                <a:latin typeface="Brush Script MT" panose="03060802040406070304" pitchFamily="66" charset="0"/>
+              </a:rPr>
+              <a:t>Favorite Cake:</a:t>
+            </a:r>
+            <a:endParaRPr lang="en-US" dirty="0">
+              <a:latin typeface="Brush Script MT" panose="03060802040406070304" pitchFamily="66" charset="0"/>
+            </a:endParaRPr>
+          </a:p>
+        </p:txBody>
+      </p:sp>
+      <p:sp>
+        <p:nvSpPr>
+          <p:cNvPr id="145" name="TextBox 144">
+            <a:extLst>
+              <a:ext uri="{FF2B5EF4-FFF2-40B4-BE49-F238E27FC236}">
+                <a16:creationId xmlns:a16="http://schemas.microsoft.com/office/drawing/2014/main" id="{27841860-3CD7-4DD4-8A81-EEA21C51B927}"/>
+              </a:ext>
+            </a:extLst>
+          </p:cNvPr>
+          <p:cNvSpPr txBox="1"/>
+          <p:nvPr/>
+        </p:nvSpPr>
+        <p:spPr>
+          <a:xfrm>
+            <a:off x="9690316" y="4754815"/>
+            <a:ext cx="2454415" cy="461665"/>
+          </a:xfrm>
+          <a:prstGeom prst="rect">
+            <a:avLst/>
+          </a:prstGeom>
+          <a:noFill/>
+        </p:spPr>
+        <p:txBody>
+          <a:bodyPr wrap="square" rtlCol="0">
+            <a:spAutoFit/>
+          </a:bodyPr>
+          <a:lstStyle/>
+          <a:p>
+            <a:pPr algn="ctr"/>
+            <a:r>
+              <a:rPr lang="en-US" sz="2400" dirty="0">
+                <a:latin typeface="Brush Script MT" panose="03060802040406070304" pitchFamily="66" charset="0"/>
+              </a:rPr>
+              <a:t>Carly </a:t>
+            </a:r>
+            <a:r>
+              <a:rPr lang="en-US" sz="2400" dirty="0" err="1">
+                <a:latin typeface="Brush Script MT" panose="03060802040406070304" pitchFamily="66" charset="0"/>
+              </a:rPr>
+              <a:t>Stasack</a:t>
+            </a:r>
+            <a:endParaRPr lang="en-US" sz="2400" dirty="0">
+              <a:latin typeface="Brush Script MT" panose="03060802040406070304" pitchFamily="66" charset="0"/>
+            </a:endParaRPr>
+          </a:p>
+        </p:txBody>
+      </p:sp>
+      <p:sp>
+        <p:nvSpPr>
+          <p:cNvPr id="146" name="TextBox 145">
+            <a:extLst>
+              <a:ext uri="{FF2B5EF4-FFF2-40B4-BE49-F238E27FC236}">
+                <a16:creationId xmlns:a16="http://schemas.microsoft.com/office/drawing/2014/main" id="{F5D8D3C5-B5EB-4D5A-A6DE-3006A87CA629}"/>
+              </a:ext>
+            </a:extLst>
+          </p:cNvPr>
+          <p:cNvSpPr txBox="1"/>
+          <p:nvPr/>
+        </p:nvSpPr>
+        <p:spPr>
+          <a:xfrm>
+            <a:off x="9645719" y="5125690"/>
+            <a:ext cx="2499011" cy="369332"/>
+          </a:xfrm>
+          <a:prstGeom prst="rect">
+            <a:avLst/>
+          </a:prstGeom>
+          <a:noFill/>
+        </p:spPr>
+        <p:txBody>
+          <a:bodyPr wrap="square" rtlCol="0">
+            <a:spAutoFit/>
+          </a:bodyPr>
+          <a:lstStyle/>
+          <a:p>
+            <a:r>
+              <a:rPr lang="en-US" u="sng" dirty="0">
+                <a:latin typeface="Brush Script MT" panose="03060802040406070304" pitchFamily="66" charset="0"/>
+              </a:rPr>
+              <a:t>Favorite Cake:</a:t>
+            </a:r>
+          </a:p>
+        </p:txBody>
+      </p:sp>
     </p:spTree>
     <p:extLst>
       <p:ext uri="{BB962C8B-B14F-4D97-AF65-F5344CB8AC3E}">

</xml_diff>